<commit_message>
Added first weeks organizational scheme and started W1 materials.
</commit_message>
<xml_diff>
--- a/Org.pptx
+++ b/Org.pptx
@@ -8,9 +8,9 @@
     <p:sldId id="256" r:id="rId2"/>
     <p:sldId id="260" r:id="rId3"/>
     <p:sldId id="261" r:id="rId4"/>
-    <p:sldId id="263" r:id="rId5"/>
+    <p:sldId id="266" r:id="rId5"/>
     <p:sldId id="265" r:id="rId6"/>
-    <p:sldId id="266" r:id="rId7"/>
+    <p:sldId id="263" r:id="rId7"/>
     <p:sldId id="262" r:id="rId8"/>
     <p:sldId id="264" r:id="rId9"/>
     <p:sldId id="259" r:id="rId10"/>
@@ -25,9 +25,9 @@
     <p:sldId id="276" r:id="rId19"/>
     <p:sldId id="279" r:id="rId20"/>
     <p:sldId id="278" r:id="rId21"/>
-    <p:sldId id="277" r:id="rId22"/>
-    <p:sldId id="281" r:id="rId23"/>
-    <p:sldId id="291" r:id="rId24"/>
+    <p:sldId id="281" r:id="rId22"/>
+    <p:sldId id="291" r:id="rId23"/>
+    <p:sldId id="277" r:id="rId24"/>
     <p:sldId id="273" r:id="rId25"/>
     <p:sldId id="274" r:id="rId26"/>
     <p:sldId id="280" r:id="rId27"/>
@@ -184,9 +184,9 @@
           <p14:sldIdLst>
             <p14:sldId id="260"/>
             <p14:sldId id="261"/>
+            <p14:sldId id="266"/>
+            <p14:sldId id="265"/>
             <p14:sldId id="263"/>
-            <p14:sldId id="265"/>
-            <p14:sldId id="266"/>
             <p14:sldId id="262"/>
             <p14:sldId id="264"/>
           </p14:sldIdLst>
@@ -209,9 +209,9 @@
             <p14:sldId id="276"/>
             <p14:sldId id="279"/>
             <p14:sldId id="278"/>
-            <p14:sldId id="277"/>
             <p14:sldId id="281"/>
             <p14:sldId id="291"/>
+            <p14:sldId id="277"/>
           </p14:sldIdLst>
         </p14:section>
         <p14:section name="Logistic regression" id="{87189187-F806-4778-8DD7-1386B490B23F}">
@@ -330,7 +330,7 @@
   <pc:docChgLst>
     <pc:chgData name="Matthieu De Mari" userId="dfb708c9-d8dc-439f-9a3b-c772bf4a311c" providerId="ADAL" clId="{B569B5DF-9659-4679-BB81-7488086DFB99}"/>
     <pc:docChg chg="undo custSel mod addSld delSld modSld sldOrd modMainMaster addSection modSection">
-      <pc:chgData name="Matthieu De Mari" userId="dfb708c9-d8dc-439f-9a3b-c772bf4a311c" providerId="ADAL" clId="{B569B5DF-9659-4679-BB81-7488086DFB99}" dt="2022-11-15T08:53:07.360" v="18592" actId="12"/>
+      <pc:chgData name="Matthieu De Mari" userId="dfb708c9-d8dc-439f-9a3b-c772bf4a311c" providerId="ADAL" clId="{B569B5DF-9659-4679-BB81-7488086DFB99}" dt="2022-11-16T07:21:47.213" v="18600"/>
       <pc:docMkLst>
         <pc:docMk/>
       </pc:docMkLst>
@@ -541,8 +541,8 @@
           </ac:spMkLst>
         </pc:spChg>
       </pc:sldChg>
-      <pc:sldChg chg="modSp new mod">
-        <pc:chgData name="Matthieu De Mari" userId="dfb708c9-d8dc-439f-9a3b-c772bf4a311c" providerId="ADAL" clId="{B569B5DF-9659-4679-BB81-7488086DFB99}" dt="2022-11-14T08:40:00.098" v="1513" actId="20577"/>
+      <pc:sldChg chg="modSp new mod ord">
+        <pc:chgData name="Matthieu De Mari" userId="dfb708c9-d8dc-439f-9a3b-c772bf4a311c" providerId="ADAL" clId="{B569B5DF-9659-4679-BB81-7488086DFB99}" dt="2022-11-16T07:21:47.213" v="18600"/>
         <pc:sldMkLst>
           <pc:docMk/>
           <pc:sldMk cId="735327594" sldId="265"/>
@@ -564,8 +564,8 @@
           </ac:spMkLst>
         </pc:spChg>
       </pc:sldChg>
-      <pc:sldChg chg="modSp new mod">
-        <pc:chgData name="Matthieu De Mari" userId="dfb708c9-d8dc-439f-9a3b-c772bf4a311c" providerId="ADAL" clId="{B569B5DF-9659-4679-BB81-7488086DFB99}" dt="2022-11-14T08:40:43.492" v="1597" actId="20577"/>
+      <pc:sldChg chg="modSp new mod ord">
+        <pc:chgData name="Matthieu De Mari" userId="dfb708c9-d8dc-439f-9a3b-c772bf4a311c" providerId="ADAL" clId="{B569B5DF-9659-4679-BB81-7488086DFB99}" dt="2022-11-16T07:21:44.207" v="18598"/>
         <pc:sldMkLst>
           <pc:docMk/>
           <pc:sldMk cId="2538433344" sldId="266"/>
@@ -833,8 +833,8 @@
           </ac:picMkLst>
         </pc:picChg>
       </pc:sldChg>
-      <pc:sldChg chg="modSp new mod">
-        <pc:chgData name="Matthieu De Mari" userId="dfb708c9-d8dc-439f-9a3b-c772bf4a311c" providerId="ADAL" clId="{B569B5DF-9659-4679-BB81-7488086DFB99}" dt="2022-11-15T04:42:45.382" v="3793" actId="20577"/>
+      <pc:sldChg chg="modSp new mod ord">
+        <pc:chgData name="Matthieu De Mari" userId="dfb708c9-d8dc-439f-9a3b-c772bf4a311c" providerId="ADAL" clId="{B569B5DF-9659-4679-BB81-7488086DFB99}" dt="2022-11-15T11:02:36.958" v="18596"/>
         <pc:sldMkLst>
           <pc:docMk/>
           <pc:sldMk cId="3314266420" sldId="277"/>
@@ -2113,7 +2113,7 @@
           <a:p>
             <a:fld id="{4883D5E9-8116-4EC0-A73B-7B504502F662}" type="datetimeFigureOut">
               <a:rPr lang="en-SG" smtClean="0"/>
-              <a:t>15/11/2022</a:t>
+              <a:t>16/11/2022</a:t>
             </a:fld>
             <a:endParaRPr lang="en-SG"/>
           </a:p>
@@ -2313,7 +2313,7 @@
           <a:p>
             <a:fld id="{4883D5E9-8116-4EC0-A73B-7B504502F662}" type="datetimeFigureOut">
               <a:rPr lang="en-SG" smtClean="0"/>
-              <a:t>15/11/2022</a:t>
+              <a:t>16/11/2022</a:t>
             </a:fld>
             <a:endParaRPr lang="en-SG"/>
           </a:p>
@@ -2523,7 +2523,7 @@
           <a:p>
             <a:fld id="{4883D5E9-8116-4EC0-A73B-7B504502F662}" type="datetimeFigureOut">
               <a:rPr lang="en-SG" smtClean="0"/>
-              <a:t>15/11/2022</a:t>
+              <a:t>16/11/2022</a:t>
             </a:fld>
             <a:endParaRPr lang="en-SG"/>
           </a:p>
@@ -2723,7 +2723,7 @@
           <a:p>
             <a:fld id="{4883D5E9-8116-4EC0-A73B-7B504502F662}" type="datetimeFigureOut">
               <a:rPr lang="en-SG" smtClean="0"/>
-              <a:t>15/11/2022</a:t>
+              <a:t>16/11/2022</a:t>
             </a:fld>
             <a:endParaRPr lang="en-SG"/>
           </a:p>
@@ -2999,7 +2999,7 @@
           <a:p>
             <a:fld id="{4883D5E9-8116-4EC0-A73B-7B504502F662}" type="datetimeFigureOut">
               <a:rPr lang="en-SG" smtClean="0"/>
-              <a:t>15/11/2022</a:t>
+              <a:t>16/11/2022</a:t>
             </a:fld>
             <a:endParaRPr lang="en-SG"/>
           </a:p>
@@ -3267,7 +3267,7 @@
           <a:p>
             <a:fld id="{4883D5E9-8116-4EC0-A73B-7B504502F662}" type="datetimeFigureOut">
               <a:rPr lang="en-SG" smtClean="0"/>
-              <a:t>15/11/2022</a:t>
+              <a:t>16/11/2022</a:t>
             </a:fld>
             <a:endParaRPr lang="en-SG"/>
           </a:p>
@@ -3682,7 +3682,7 @@
           <a:p>
             <a:fld id="{4883D5E9-8116-4EC0-A73B-7B504502F662}" type="datetimeFigureOut">
               <a:rPr lang="en-SG" smtClean="0"/>
-              <a:t>15/11/2022</a:t>
+              <a:t>16/11/2022</a:t>
             </a:fld>
             <a:endParaRPr lang="en-SG"/>
           </a:p>
@@ -3824,7 +3824,7 @@
           <a:p>
             <a:fld id="{4883D5E9-8116-4EC0-A73B-7B504502F662}" type="datetimeFigureOut">
               <a:rPr lang="en-SG" smtClean="0"/>
-              <a:t>15/11/2022</a:t>
+              <a:t>16/11/2022</a:t>
             </a:fld>
             <a:endParaRPr lang="en-SG"/>
           </a:p>
@@ -3937,7 +3937,7 @@
           <a:p>
             <a:fld id="{4883D5E9-8116-4EC0-A73B-7B504502F662}" type="datetimeFigureOut">
               <a:rPr lang="en-SG" smtClean="0"/>
-              <a:t>15/11/2022</a:t>
+              <a:t>16/11/2022</a:t>
             </a:fld>
             <a:endParaRPr lang="en-SG"/>
           </a:p>
@@ -4250,7 +4250,7 @@
           <a:p>
             <a:fld id="{4883D5E9-8116-4EC0-A73B-7B504502F662}" type="datetimeFigureOut">
               <a:rPr lang="en-SG" smtClean="0"/>
-              <a:t>15/11/2022</a:t>
+              <a:t>16/11/2022</a:t>
             </a:fld>
             <a:endParaRPr lang="en-SG"/>
           </a:p>
@@ -4539,7 +4539,7 @@
           <a:p>
             <a:fld id="{4883D5E9-8116-4EC0-A73B-7B504502F662}" type="datetimeFigureOut">
               <a:rPr lang="en-SG" smtClean="0"/>
-              <a:t>15/11/2022</a:t>
+              <a:t>16/11/2022</a:t>
             </a:fld>
             <a:endParaRPr lang="en-SG"/>
           </a:p>
@@ -4782,7 +4782,7 @@
           <a:p>
             <a:fld id="{4883D5E9-8116-4EC0-A73B-7B504502F662}" type="datetimeFigureOut">
               <a:rPr lang="en-SG" smtClean="0"/>
-              <a:t>15/11/2022</a:t>
+              <a:t>16/11/2022</a:t>
             </a:fld>
             <a:endParaRPr lang="en-SG"/>
           </a:p>
@@ -6769,7 +6769,7 @@
           <p:cNvPr id="2" name="Title 1">
             <a:extLst>
               <a:ext uri="{FF2B5EF4-FFF2-40B4-BE49-F238E27FC236}">
-                <a16:creationId xmlns:a16="http://schemas.microsoft.com/office/drawing/2014/main" id="{F42743DD-8E8F-E7B7-A834-82799614ED44}"/>
+                <a16:creationId xmlns:a16="http://schemas.microsoft.com/office/drawing/2014/main" id="{1BC2F77B-B631-F46B-D880-FE88C8FC695E}"/>
               </a:ext>
             </a:extLst>
           </p:cNvPr>
@@ -6787,7 +6787,7 @@
           <a:p>
             <a:r>
               <a:rPr lang="en-GB" dirty="0"/>
-              <a:t>From linear to ridge regression</a:t>
+              <a:t>Derivatives, gradients and backprop</a:t>
             </a:r>
             <a:endParaRPr lang="en-SG" dirty="0"/>
           </a:p>
@@ -6798,7 +6798,7 @@
           <p:cNvPr id="3" name="Content Placeholder 2">
             <a:extLst>
               <a:ext uri="{FF2B5EF4-FFF2-40B4-BE49-F238E27FC236}">
-                <a16:creationId xmlns:a16="http://schemas.microsoft.com/office/drawing/2014/main" id="{B36F7A02-748C-0E9F-D845-17B53A1D917E}"/>
+                <a16:creationId xmlns:a16="http://schemas.microsoft.com/office/drawing/2014/main" id="{EEB5DC3B-4A9E-B372-7EA8-C4905D6DDDE5}"/>
               </a:ext>
             </a:extLst>
           </p:cNvPr>
@@ -6809,34 +6809,42 @@
             <p:ph idx="1"/>
           </p:nvPr>
         </p:nvSpPr>
-        <p:spPr/>
-        <p:txBody>
-          <a:bodyPr/>
-          <a:lstStyle/>
-          <a:p>
-            <a:r>
-              <a:rPr lang="en-GB" dirty="0"/>
-              <a:t>Principles of regularization</a:t>
-            </a:r>
-          </a:p>
-          <a:p>
-            <a:r>
-              <a:rPr lang="en-GB" dirty="0"/>
-              <a:t>Why is regularization helping in avoiding overfitting?</a:t>
-            </a:r>
-          </a:p>
-          <a:p>
-            <a:r>
-              <a:rPr lang="en-GB" dirty="0"/>
-              <a:t>Show implementation and effect</a:t>
-            </a:r>
+        <p:spPr>
+          <a:xfrm>
+            <a:off x="838200" y="1825624"/>
+            <a:ext cx="10515600" cy="5032375"/>
+          </a:xfrm>
+        </p:spPr>
+        <p:txBody>
+          <a:bodyPr/>
+          <a:lstStyle/>
+          <a:p>
+            <a:r>
+              <a:rPr lang="en-GB" dirty="0"/>
+              <a:t>Show that we can derive optimal parameters, but it eventually requires to invert a big matrix.</a:t>
+            </a:r>
+          </a:p>
+          <a:p>
+            <a:r>
+              <a:rPr lang="en-GB" dirty="0"/>
+              <a:t>Show that we might approximate that with gradient descent, because the loss function is convex! (nice).</a:t>
+            </a:r>
+          </a:p>
+          <a:p>
+            <a:r>
+              <a:rPr lang="en-GB" dirty="0"/>
+              <a:t>How to compute and approximate gradients (mathematical reminder)</a:t>
+            </a:r>
+          </a:p>
+          <a:p>
+            <a:endParaRPr lang="en-GB" dirty="0"/>
           </a:p>
         </p:txBody>
       </p:sp>
     </p:spTree>
     <p:extLst>
       <p:ext uri="{BB962C8B-B14F-4D97-AF65-F5344CB8AC3E}">
-        <p14:creationId xmlns:p14="http://schemas.microsoft.com/office/powerpoint/2010/main" val="3314266420"/>
+        <p14:creationId xmlns:p14="http://schemas.microsoft.com/office/powerpoint/2010/main" val="2347683629"/>
       </p:ext>
     </p:extLst>
   </p:cSld>
@@ -6868,7 +6876,7 @@
           <p:cNvPr id="2" name="Title 1">
             <a:extLst>
               <a:ext uri="{FF2B5EF4-FFF2-40B4-BE49-F238E27FC236}">
-                <a16:creationId xmlns:a16="http://schemas.microsoft.com/office/drawing/2014/main" id="{1BC2F77B-B631-F46B-D880-FE88C8FC695E}"/>
+                <a16:creationId xmlns:a16="http://schemas.microsoft.com/office/drawing/2014/main" id="{C7A40B67-9C86-2550-D52B-4DDB631E8118}"/>
               </a:ext>
             </a:extLst>
           </p:cNvPr>
@@ -6886,7 +6894,7 @@
           <a:p>
             <a:r>
               <a:rPr lang="en-GB" dirty="0"/>
-              <a:t>Derivatives, gradients and backprop</a:t>
+              <a:t>Reminder on gradients</a:t>
             </a:r>
             <a:endParaRPr lang="en-SG" dirty="0"/>
           </a:p>
@@ -6897,7 +6905,7 @@
           <p:cNvPr id="3" name="Content Placeholder 2">
             <a:extLst>
               <a:ext uri="{FF2B5EF4-FFF2-40B4-BE49-F238E27FC236}">
-                <a16:creationId xmlns:a16="http://schemas.microsoft.com/office/drawing/2014/main" id="{EEB5DC3B-4A9E-B372-7EA8-C4905D6DDDE5}"/>
+                <a16:creationId xmlns:a16="http://schemas.microsoft.com/office/drawing/2014/main" id="{C19F139E-EB3A-1BC2-9D93-6373C30BA7AB}"/>
               </a:ext>
             </a:extLst>
           </p:cNvPr>
@@ -6908,42 +6916,38 @@
             <p:ph idx="1"/>
           </p:nvPr>
         </p:nvSpPr>
-        <p:spPr>
-          <a:xfrm>
-            <a:off x="838200" y="1825624"/>
-            <a:ext cx="10515600" cy="5032375"/>
-          </a:xfrm>
-        </p:spPr>
-        <p:txBody>
-          <a:bodyPr/>
-          <a:lstStyle/>
-          <a:p>
-            <a:r>
-              <a:rPr lang="en-GB" dirty="0"/>
-              <a:t>Show that we can derive optimal parameters, but it eventually requires to invert a big matrix.</a:t>
-            </a:r>
-          </a:p>
-          <a:p>
-            <a:r>
-              <a:rPr lang="en-GB" dirty="0"/>
-              <a:t>Show that we might approximate that with gradient descent, because the loss function is convex! (nice).</a:t>
-            </a:r>
-          </a:p>
-          <a:p>
-            <a:r>
-              <a:rPr lang="en-GB" dirty="0"/>
-              <a:t>How to compute and approximate gradients (mathematical reminder)</a:t>
-            </a:r>
-          </a:p>
-          <a:p>
-            <a:endParaRPr lang="en-GB" dirty="0"/>
+        <p:spPr/>
+        <p:txBody>
+          <a:bodyPr/>
+          <a:lstStyle/>
+          <a:p>
+            <a:r>
+              <a:rPr lang="en-GB" dirty="0"/>
+              <a:t>Part 1 of gradients, reminder about gradients and their meaning, gradient descent procedure to minimize loss by choosing parameters and its convergence guarantees in the case of convex functions (explain why non-convex might be problematic).</a:t>
+            </a:r>
+          </a:p>
+          <a:p>
+            <a:r>
+              <a:rPr lang="en-GB" dirty="0"/>
+              <a:t>Show effect of parameters (step size, stopping threshold, etc.) on gradient descent effect.</a:t>
+            </a:r>
+          </a:p>
+          <a:p>
+            <a:r>
+              <a:rPr lang="en-GB" dirty="0"/>
+              <a:t>Implementation notebook and demo.</a:t>
+            </a:r>
+            <a:endParaRPr lang="en-SG" dirty="0"/>
+          </a:p>
+          <a:p>
+            <a:endParaRPr lang="en-SG" dirty="0"/>
           </a:p>
         </p:txBody>
       </p:sp>
     </p:spTree>
     <p:extLst>
       <p:ext uri="{BB962C8B-B14F-4D97-AF65-F5344CB8AC3E}">
-        <p14:creationId xmlns:p14="http://schemas.microsoft.com/office/powerpoint/2010/main" val="2347683629"/>
+        <p14:creationId xmlns:p14="http://schemas.microsoft.com/office/powerpoint/2010/main" val="1995408201"/>
       </p:ext>
     </p:extLst>
   </p:cSld>
@@ -6975,7 +6979,7 @@
           <p:cNvPr id="2" name="Title 1">
             <a:extLst>
               <a:ext uri="{FF2B5EF4-FFF2-40B4-BE49-F238E27FC236}">
-                <a16:creationId xmlns:a16="http://schemas.microsoft.com/office/drawing/2014/main" id="{C7A40B67-9C86-2550-D52B-4DDB631E8118}"/>
+                <a16:creationId xmlns:a16="http://schemas.microsoft.com/office/drawing/2014/main" id="{F42743DD-8E8F-E7B7-A834-82799614ED44}"/>
               </a:ext>
             </a:extLst>
           </p:cNvPr>
@@ -6993,7 +6997,7 @@
           <a:p>
             <a:r>
               <a:rPr lang="en-GB" dirty="0"/>
-              <a:t>Reminder on gradients</a:t>
+              <a:t>From linear to ridge regression</a:t>
             </a:r>
             <a:endParaRPr lang="en-SG" dirty="0"/>
           </a:p>
@@ -7004,7 +7008,7 @@
           <p:cNvPr id="3" name="Content Placeholder 2">
             <a:extLst>
               <a:ext uri="{FF2B5EF4-FFF2-40B4-BE49-F238E27FC236}">
-                <a16:creationId xmlns:a16="http://schemas.microsoft.com/office/drawing/2014/main" id="{C19F139E-EB3A-1BC2-9D93-6373C30BA7AB}"/>
+                <a16:creationId xmlns:a16="http://schemas.microsoft.com/office/drawing/2014/main" id="{B36F7A02-748C-0E9F-D845-17B53A1D917E}"/>
               </a:ext>
             </a:extLst>
           </p:cNvPr>
@@ -7022,31 +7026,27 @@
           <a:p>
             <a:r>
               <a:rPr lang="en-GB" dirty="0"/>
-              <a:t>Part 1 of gradients, reminder about gradients and their meaning, gradient descent procedure to minimize loss by choosing parameters and its convergence guarantees in the case of convex functions (explain why non-convex might be problematic).</a:t>
-            </a:r>
-          </a:p>
-          <a:p>
-            <a:r>
-              <a:rPr lang="en-GB" dirty="0"/>
-              <a:t>Show effect of parameters (step size, stopping threshold, etc.) on gradient descent effect.</a:t>
-            </a:r>
-          </a:p>
-          <a:p>
-            <a:r>
-              <a:rPr lang="en-GB" dirty="0"/>
-              <a:t>Implementation notebook and demo.</a:t>
-            </a:r>
-            <a:endParaRPr lang="en-SG" dirty="0"/>
-          </a:p>
-          <a:p>
-            <a:endParaRPr lang="en-SG" dirty="0"/>
+              <a:t>Principles of regularization</a:t>
+            </a:r>
+          </a:p>
+          <a:p>
+            <a:r>
+              <a:rPr lang="en-GB" dirty="0"/>
+              <a:t>Why is regularization helping in avoiding overfitting?</a:t>
+            </a:r>
+          </a:p>
+          <a:p>
+            <a:r>
+              <a:rPr lang="en-GB" dirty="0"/>
+              <a:t>Show implementation and effect</a:t>
+            </a:r>
           </a:p>
         </p:txBody>
       </p:sp>
     </p:spTree>
     <p:extLst>
       <p:ext uri="{BB962C8B-B14F-4D97-AF65-F5344CB8AC3E}">
-        <p14:creationId xmlns:p14="http://schemas.microsoft.com/office/powerpoint/2010/main" val="1995408201"/>
+        <p14:creationId xmlns:p14="http://schemas.microsoft.com/office/powerpoint/2010/main" val="3314266420"/>
       </p:ext>
     </p:extLst>
   </p:cSld>
@@ -9208,7 +9208,7 @@
           <p:cNvPr id="2" name="Title 1">
             <a:extLst>
               <a:ext uri="{FF2B5EF4-FFF2-40B4-BE49-F238E27FC236}">
-                <a16:creationId xmlns:a16="http://schemas.microsoft.com/office/drawing/2014/main" id="{9FBB04B9-0714-5AC4-7FC9-968A466F0888}"/>
+                <a16:creationId xmlns:a16="http://schemas.microsoft.com/office/drawing/2014/main" id="{C3768402-0D78-D2AA-DA19-EDAE41BBBA42}"/>
               </a:ext>
             </a:extLst>
           </p:cNvPr>
@@ -9226,7 +9226,7 @@
           <a:p>
             <a:r>
               <a:rPr lang="en-GB" dirty="0"/>
-              <a:t>Grading</a:t>
+              <a:t>Syllabus (week by week explanation)</a:t>
             </a:r>
             <a:endParaRPr lang="en-SG" dirty="0"/>
           </a:p>
@@ -9237,7 +9237,7 @@
           <p:cNvPr id="3" name="Content Placeholder 2">
             <a:extLst>
               <a:ext uri="{FF2B5EF4-FFF2-40B4-BE49-F238E27FC236}">
-                <a16:creationId xmlns:a16="http://schemas.microsoft.com/office/drawing/2014/main" id="{CFB8399C-5E5C-8BB5-01BA-F7381754CA47}"/>
+                <a16:creationId xmlns:a16="http://schemas.microsoft.com/office/drawing/2014/main" id="{55CED521-C842-1550-6F5F-56F8729C75BC}"/>
               </a:ext>
             </a:extLst>
           </p:cNvPr>
@@ -9253,45 +9253,14 @@
           <a:bodyPr/>
           <a:lstStyle/>
           <a:p>
-            <a:r>
-              <a:rPr lang="en-GB" dirty="0" err="1"/>
-              <a:t>Homeworks</a:t>
-            </a:r>
-            <a:endParaRPr lang="en-GB" dirty="0"/>
-          </a:p>
-          <a:p>
-            <a:r>
-              <a:rPr lang="en-GB" dirty="0"/>
-              <a:t>Project</a:t>
-            </a:r>
-          </a:p>
-          <a:p>
-            <a:r>
-              <a:rPr lang="en-GB" dirty="0"/>
-              <a:t>Two exams</a:t>
-            </a:r>
-          </a:p>
-          <a:p>
-            <a:r>
-              <a:rPr lang="en-GB" dirty="0"/>
-              <a:t>Participation</a:t>
-            </a:r>
-          </a:p>
-          <a:p>
-            <a:r>
-              <a:rPr lang="en-GB" dirty="0"/>
-              <a:t>Survey</a:t>
-            </a:r>
-          </a:p>
-          <a:p>
-            <a:endParaRPr lang="en-SG" dirty="0"/>
+            <a:endParaRPr lang="en-SG"/>
           </a:p>
         </p:txBody>
       </p:sp>
     </p:spTree>
     <p:extLst>
       <p:ext uri="{BB962C8B-B14F-4D97-AF65-F5344CB8AC3E}">
-        <p14:creationId xmlns:p14="http://schemas.microsoft.com/office/powerpoint/2010/main" val="2364192852"/>
+        <p14:creationId xmlns:p14="http://schemas.microsoft.com/office/powerpoint/2010/main" val="2538433344"/>
       </p:ext>
     </p:extLst>
   </p:cSld>
@@ -11939,7 +11908,7 @@
           <p:cNvPr id="2" name="Title 1">
             <a:extLst>
               <a:ext uri="{FF2B5EF4-FFF2-40B4-BE49-F238E27FC236}">
-                <a16:creationId xmlns:a16="http://schemas.microsoft.com/office/drawing/2014/main" id="{C3768402-0D78-D2AA-DA19-EDAE41BBBA42}"/>
+                <a16:creationId xmlns:a16="http://schemas.microsoft.com/office/drawing/2014/main" id="{9FBB04B9-0714-5AC4-7FC9-968A466F0888}"/>
               </a:ext>
             </a:extLst>
           </p:cNvPr>
@@ -11957,7 +11926,7 @@
           <a:p>
             <a:r>
               <a:rPr lang="en-GB" dirty="0"/>
-              <a:t>Syllabus (week by week explanation)</a:t>
+              <a:t>Grading</a:t>
             </a:r>
             <a:endParaRPr lang="en-SG" dirty="0"/>
           </a:p>
@@ -11968,7 +11937,7 @@
           <p:cNvPr id="3" name="Content Placeholder 2">
             <a:extLst>
               <a:ext uri="{FF2B5EF4-FFF2-40B4-BE49-F238E27FC236}">
-                <a16:creationId xmlns:a16="http://schemas.microsoft.com/office/drawing/2014/main" id="{55CED521-C842-1550-6F5F-56F8729C75BC}"/>
+                <a16:creationId xmlns:a16="http://schemas.microsoft.com/office/drawing/2014/main" id="{CFB8399C-5E5C-8BB5-01BA-F7381754CA47}"/>
               </a:ext>
             </a:extLst>
           </p:cNvPr>
@@ -11984,14 +11953,45 @@
           <a:bodyPr/>
           <a:lstStyle/>
           <a:p>
-            <a:endParaRPr lang="en-SG"/>
+            <a:r>
+              <a:rPr lang="en-GB" dirty="0" err="1"/>
+              <a:t>Homeworks</a:t>
+            </a:r>
+            <a:endParaRPr lang="en-GB" dirty="0"/>
+          </a:p>
+          <a:p>
+            <a:r>
+              <a:rPr lang="en-GB" dirty="0"/>
+              <a:t>Project</a:t>
+            </a:r>
+          </a:p>
+          <a:p>
+            <a:r>
+              <a:rPr lang="en-GB" dirty="0"/>
+              <a:t>Two exams</a:t>
+            </a:r>
+          </a:p>
+          <a:p>
+            <a:r>
+              <a:rPr lang="en-GB" dirty="0"/>
+              <a:t>Participation</a:t>
+            </a:r>
+          </a:p>
+          <a:p>
+            <a:r>
+              <a:rPr lang="en-GB" dirty="0"/>
+              <a:t>Survey</a:t>
+            </a:r>
+          </a:p>
+          <a:p>
+            <a:endParaRPr lang="en-SG" dirty="0"/>
           </a:p>
         </p:txBody>
       </p:sp>
     </p:spTree>
     <p:extLst>
       <p:ext uri="{BB962C8B-B14F-4D97-AF65-F5344CB8AC3E}">
-        <p14:creationId xmlns:p14="http://schemas.microsoft.com/office/powerpoint/2010/main" val="2538433344"/>
+        <p14:creationId xmlns:p14="http://schemas.microsoft.com/office/powerpoint/2010/main" val="2364192852"/>
       </p:ext>
     </p:extLst>
   </p:cSld>

</xml_diff>

<commit_message>
Added some slides to Week 1.
</commit_message>
<xml_diff>
--- a/Org.pptx
+++ b/Org.pptx
@@ -1956,18 +1956,48 @@
   <pc:docChgLst>
     <pc:chgData name="Matthieu De Mari" userId="dfb708c9-d8dc-439f-9a3b-c772bf4a311c" providerId="ADAL" clId="{87881257-A251-408C-B52F-FEE209544685}"/>
     <pc:docChg chg="custSel modSld">
-      <pc:chgData name="Matthieu De Mari" userId="dfb708c9-d8dc-439f-9a3b-c772bf4a311c" providerId="ADAL" clId="{87881257-A251-408C-B52F-FEE209544685}" dt="2023-01-06T16:39:39.382" v="168" actId="20577"/>
+      <pc:chgData name="Matthieu De Mari" userId="dfb708c9-d8dc-439f-9a3b-c772bf4a311c" providerId="ADAL" clId="{87881257-A251-408C-B52F-FEE209544685}" dt="2023-01-23T04:58:09.801" v="201" actId="207"/>
       <pc:docMkLst>
         <pc:docMk/>
       </pc:docMkLst>
       <pc:sldChg chg="modSp mod">
-        <pc:chgData name="Matthieu De Mari" userId="dfb708c9-d8dc-439f-9a3b-c772bf4a311c" providerId="ADAL" clId="{87881257-A251-408C-B52F-FEE209544685}" dt="2023-01-06T16:35:42.146" v="103" actId="207"/>
+        <pc:chgData name="Matthieu De Mari" userId="dfb708c9-d8dc-439f-9a3b-c772bf4a311c" providerId="ADAL" clId="{87881257-A251-408C-B52F-FEE209544685}" dt="2023-01-23T04:57:36.993" v="198" actId="207"/>
+        <pc:sldMkLst>
+          <pc:docMk/>
+          <pc:sldMk cId="640029402" sldId="257"/>
+        </pc:sldMkLst>
+        <pc:spChg chg="mod">
+          <ac:chgData name="Matthieu De Mari" userId="dfb708c9-d8dc-439f-9a3b-c772bf4a311c" providerId="ADAL" clId="{87881257-A251-408C-B52F-FEE209544685}" dt="2023-01-23T04:57:36.993" v="198" actId="207"/>
+          <ac:spMkLst>
+            <pc:docMk/>
+            <pc:sldMk cId="640029402" sldId="257"/>
+            <ac:spMk id="2" creationId="{F1EA9723-7B37-984E-761B-02D2BCB6AEA5}"/>
+          </ac:spMkLst>
+        </pc:spChg>
+      </pc:sldChg>
+      <pc:sldChg chg="modSp mod">
+        <pc:chgData name="Matthieu De Mari" userId="dfb708c9-d8dc-439f-9a3b-c772bf4a311c" providerId="ADAL" clId="{87881257-A251-408C-B52F-FEE209544685}" dt="2023-01-23T04:57:42.211" v="199" actId="207"/>
+        <pc:sldMkLst>
+          <pc:docMk/>
+          <pc:sldMk cId="512894815" sldId="258"/>
+        </pc:sldMkLst>
+        <pc:spChg chg="mod">
+          <ac:chgData name="Matthieu De Mari" userId="dfb708c9-d8dc-439f-9a3b-c772bf4a311c" providerId="ADAL" clId="{87881257-A251-408C-B52F-FEE209544685}" dt="2023-01-23T04:57:42.211" v="199" actId="207"/>
+          <ac:spMkLst>
+            <pc:docMk/>
+            <pc:sldMk cId="512894815" sldId="258"/>
+            <ac:spMk id="2" creationId="{3BE026C2-EE22-7114-75F6-6EF59A598FA2}"/>
+          </ac:spMkLst>
+        </pc:spChg>
+      </pc:sldChg>
+      <pc:sldChg chg="modSp mod">
+        <pc:chgData name="Matthieu De Mari" userId="dfb708c9-d8dc-439f-9a3b-c772bf4a311c" providerId="ADAL" clId="{87881257-A251-408C-B52F-FEE209544685}" dt="2023-01-23T04:57:34.184" v="197" actId="207"/>
         <pc:sldMkLst>
           <pc:docMk/>
           <pc:sldMk cId="737984391" sldId="259"/>
         </pc:sldMkLst>
         <pc:spChg chg="mod">
-          <ac:chgData name="Matthieu De Mari" userId="dfb708c9-d8dc-439f-9a3b-c772bf4a311c" providerId="ADAL" clId="{87881257-A251-408C-B52F-FEE209544685}" dt="2023-01-06T16:35:42.146" v="103" actId="207"/>
+          <ac:chgData name="Matthieu De Mari" userId="dfb708c9-d8dc-439f-9a3b-c772bf4a311c" providerId="ADAL" clId="{87881257-A251-408C-B52F-FEE209544685}" dt="2023-01-23T04:57:34.184" v="197" actId="207"/>
           <ac:spMkLst>
             <pc:docMk/>
             <pc:sldMk cId="737984391" sldId="259"/>
@@ -2014,7 +2044,7 @@
         </pc:spChg>
       </pc:sldChg>
       <pc:sldChg chg="modSp mod">
-        <pc:chgData name="Matthieu De Mari" userId="dfb708c9-d8dc-439f-9a3b-c772bf4a311c" providerId="ADAL" clId="{87881257-A251-408C-B52F-FEE209544685}" dt="2023-01-06T16:34:32.231" v="4" actId="207"/>
+        <pc:chgData name="Matthieu De Mari" userId="dfb708c9-d8dc-439f-9a3b-c772bf4a311c" providerId="ADAL" clId="{87881257-A251-408C-B52F-FEE209544685}" dt="2023-01-23T02:05:38.299" v="196" actId="20577"/>
         <pc:sldMkLst>
           <pc:docMk/>
           <pc:sldMk cId="2825313071" sldId="262"/>
@@ -2025,6 +2055,14 @@
             <pc:docMk/>
             <pc:sldMk cId="2825313071" sldId="262"/>
             <ac:spMk id="2" creationId="{17F9F432-384E-0E63-A415-3C6F159D0913}"/>
+          </ac:spMkLst>
+        </pc:spChg>
+        <pc:spChg chg="mod">
+          <ac:chgData name="Matthieu De Mari" userId="dfb708c9-d8dc-439f-9a3b-c772bf4a311c" providerId="ADAL" clId="{87881257-A251-408C-B52F-FEE209544685}" dt="2023-01-23T02:05:38.299" v="196" actId="20577"/>
+          <ac:spMkLst>
+            <pc:docMk/>
+            <pc:sldMk cId="2825313071" sldId="262"/>
+            <ac:spMk id="3" creationId="{688A0069-2E75-BE38-DE3D-60C04B3DF374}"/>
           </ac:spMkLst>
         </pc:spChg>
       </pc:sldChg>
@@ -2089,13 +2127,13 @@
         </pc:spChg>
       </pc:sldChg>
       <pc:sldChg chg="modSp mod">
-        <pc:chgData name="Matthieu De Mari" userId="dfb708c9-d8dc-439f-9a3b-c772bf4a311c" providerId="ADAL" clId="{87881257-A251-408C-B52F-FEE209544685}" dt="2023-01-06T16:35:47.262" v="104" actId="207"/>
+        <pc:chgData name="Matthieu De Mari" userId="dfb708c9-d8dc-439f-9a3b-c772bf4a311c" providerId="ADAL" clId="{87881257-A251-408C-B52F-FEE209544685}" dt="2023-01-23T04:58:04.866" v="200" actId="207"/>
         <pc:sldMkLst>
           <pc:docMk/>
           <pc:sldMk cId="3969303452" sldId="269"/>
         </pc:sldMkLst>
         <pc:spChg chg="mod">
-          <ac:chgData name="Matthieu De Mari" userId="dfb708c9-d8dc-439f-9a3b-c772bf4a311c" providerId="ADAL" clId="{87881257-A251-408C-B52F-FEE209544685}" dt="2023-01-06T16:35:47.262" v="104" actId="207"/>
+          <ac:chgData name="Matthieu De Mari" userId="dfb708c9-d8dc-439f-9a3b-c772bf4a311c" providerId="ADAL" clId="{87881257-A251-408C-B52F-FEE209544685}" dt="2023-01-23T04:58:04.866" v="200" actId="207"/>
           <ac:spMkLst>
             <pc:docMk/>
             <pc:sldMk cId="3969303452" sldId="269"/>
@@ -2134,13 +2172,13 @@
         </pc:spChg>
       </pc:sldChg>
       <pc:sldChg chg="modSp mod">
-        <pc:chgData name="Matthieu De Mari" userId="dfb708c9-d8dc-439f-9a3b-c772bf4a311c" providerId="ADAL" clId="{87881257-A251-408C-B52F-FEE209544685}" dt="2023-01-06T16:36:00.965" v="125" actId="207"/>
+        <pc:chgData name="Matthieu De Mari" userId="dfb708c9-d8dc-439f-9a3b-c772bf4a311c" providerId="ADAL" clId="{87881257-A251-408C-B52F-FEE209544685}" dt="2023-01-23T04:58:09.801" v="201" actId="207"/>
         <pc:sldMkLst>
           <pc:docMk/>
           <pc:sldMk cId="4147646622" sldId="272"/>
         </pc:sldMkLst>
         <pc:spChg chg="mod">
-          <ac:chgData name="Matthieu De Mari" userId="dfb708c9-d8dc-439f-9a3b-c772bf4a311c" providerId="ADAL" clId="{87881257-A251-408C-B52F-FEE209544685}" dt="2023-01-06T16:36:00.965" v="125" actId="207"/>
+          <ac:chgData name="Matthieu De Mari" userId="dfb708c9-d8dc-439f-9a3b-c772bf4a311c" providerId="ADAL" clId="{87881257-A251-408C-B52F-FEE209544685}" dt="2023-01-23T04:58:09.801" v="201" actId="207"/>
           <ac:spMkLst>
             <pc:docMk/>
             <pc:sldMk cId="4147646622" sldId="272"/>
@@ -2731,7 +2769,7 @@
           <a:p>
             <a:fld id="{4883D5E9-8116-4EC0-A73B-7B504502F662}" type="datetimeFigureOut">
               <a:rPr lang="en-SG" smtClean="0"/>
-              <a:t>6/1/2023</a:t>
+              <a:t>23/1/2023</a:t>
             </a:fld>
             <a:endParaRPr lang="en-SG"/>
           </a:p>
@@ -2931,7 +2969,7 @@
           <a:p>
             <a:fld id="{4883D5E9-8116-4EC0-A73B-7B504502F662}" type="datetimeFigureOut">
               <a:rPr lang="en-SG" smtClean="0"/>
-              <a:t>6/1/2023</a:t>
+              <a:t>23/1/2023</a:t>
             </a:fld>
             <a:endParaRPr lang="en-SG"/>
           </a:p>
@@ -3141,7 +3179,7 @@
           <a:p>
             <a:fld id="{4883D5E9-8116-4EC0-A73B-7B504502F662}" type="datetimeFigureOut">
               <a:rPr lang="en-SG" smtClean="0"/>
-              <a:t>6/1/2023</a:t>
+              <a:t>23/1/2023</a:t>
             </a:fld>
             <a:endParaRPr lang="en-SG"/>
           </a:p>
@@ -3341,7 +3379,7 @@
           <a:p>
             <a:fld id="{4883D5E9-8116-4EC0-A73B-7B504502F662}" type="datetimeFigureOut">
               <a:rPr lang="en-SG" smtClean="0"/>
-              <a:t>6/1/2023</a:t>
+              <a:t>23/1/2023</a:t>
             </a:fld>
             <a:endParaRPr lang="en-SG"/>
           </a:p>
@@ -3617,7 +3655,7 @@
           <a:p>
             <a:fld id="{4883D5E9-8116-4EC0-A73B-7B504502F662}" type="datetimeFigureOut">
               <a:rPr lang="en-SG" smtClean="0"/>
-              <a:t>6/1/2023</a:t>
+              <a:t>23/1/2023</a:t>
             </a:fld>
             <a:endParaRPr lang="en-SG"/>
           </a:p>
@@ -3885,7 +3923,7 @@
           <a:p>
             <a:fld id="{4883D5E9-8116-4EC0-A73B-7B504502F662}" type="datetimeFigureOut">
               <a:rPr lang="en-SG" smtClean="0"/>
-              <a:t>6/1/2023</a:t>
+              <a:t>23/1/2023</a:t>
             </a:fld>
             <a:endParaRPr lang="en-SG"/>
           </a:p>
@@ -4300,7 +4338,7 @@
           <a:p>
             <a:fld id="{4883D5E9-8116-4EC0-A73B-7B504502F662}" type="datetimeFigureOut">
               <a:rPr lang="en-SG" smtClean="0"/>
-              <a:t>6/1/2023</a:t>
+              <a:t>23/1/2023</a:t>
             </a:fld>
             <a:endParaRPr lang="en-SG"/>
           </a:p>
@@ -4442,7 +4480,7 @@
           <a:p>
             <a:fld id="{4883D5E9-8116-4EC0-A73B-7B504502F662}" type="datetimeFigureOut">
               <a:rPr lang="en-SG" smtClean="0"/>
-              <a:t>6/1/2023</a:t>
+              <a:t>23/1/2023</a:t>
             </a:fld>
             <a:endParaRPr lang="en-SG"/>
           </a:p>
@@ -4555,7 +4593,7 @@
           <a:p>
             <a:fld id="{4883D5E9-8116-4EC0-A73B-7B504502F662}" type="datetimeFigureOut">
               <a:rPr lang="en-SG" smtClean="0"/>
-              <a:t>6/1/2023</a:t>
+              <a:t>23/1/2023</a:t>
             </a:fld>
             <a:endParaRPr lang="en-SG"/>
           </a:p>
@@ -4868,7 +4906,7 @@
           <a:p>
             <a:fld id="{4883D5E9-8116-4EC0-A73B-7B504502F662}" type="datetimeFigureOut">
               <a:rPr lang="en-SG" smtClean="0"/>
-              <a:t>6/1/2023</a:t>
+              <a:t>23/1/2023</a:t>
             </a:fld>
             <a:endParaRPr lang="en-SG"/>
           </a:p>
@@ -5157,7 +5195,7 @@
           <a:p>
             <a:fld id="{4883D5E9-8116-4EC0-A73B-7B504502F662}" type="datetimeFigureOut">
               <a:rPr lang="en-SG" smtClean="0"/>
-              <a:t>6/1/2023</a:t>
+              <a:t>23/1/2023</a:t>
             </a:fld>
             <a:endParaRPr lang="en-SG"/>
           </a:p>
@@ -5400,7 +5438,7 @@
           <a:p>
             <a:fld id="{4883D5E9-8116-4EC0-A73B-7B504502F662}" type="datetimeFigureOut">
               <a:rPr lang="en-SG" smtClean="0"/>
-              <a:t>6/1/2023</a:t>
+              <a:t>23/1/2023</a:t>
             </a:fld>
             <a:endParaRPr lang="en-SG"/>
           </a:p>
@@ -6021,10 +6059,18 @@
           <a:lstStyle/>
           <a:p>
             <a:r>
-              <a:rPr lang="en-GB" dirty="0"/>
+              <a:rPr lang="en-GB" dirty="0">
+                <a:solidFill>
+                  <a:srgbClr val="00B050"/>
+                </a:solidFill>
+              </a:rPr>
               <a:t>The 5 parameters of a ML problem</a:t>
             </a:r>
-            <a:endParaRPr lang="en-SG" dirty="0"/>
+            <a:endParaRPr lang="en-SG" dirty="0">
+              <a:solidFill>
+                <a:srgbClr val="00B050"/>
+              </a:solidFill>
+            </a:endParaRPr>
           </a:p>
         </p:txBody>
       </p:sp>
@@ -6136,10 +6182,18 @@
           <a:lstStyle/>
           <a:p>
             <a:r>
-              <a:rPr lang="en-GB" dirty="0"/>
+              <a:rPr lang="en-GB" dirty="0">
+                <a:solidFill>
+                  <a:srgbClr val="00B050"/>
+                </a:solidFill>
+              </a:rPr>
               <a:t>A few examples of ML problems</a:t>
             </a:r>
-            <a:endParaRPr lang="en-SG" dirty="0"/>
+            <a:endParaRPr lang="en-SG" dirty="0">
+              <a:solidFill>
+                <a:srgbClr val="00B050"/>
+              </a:solidFill>
+            </a:endParaRPr>
           </a:p>
         </p:txBody>
       </p:sp>
@@ -6360,14 +6414,14 @@
             <a:r>
               <a:rPr lang="en-GB" dirty="0">
                 <a:solidFill>
-                  <a:schemeClr val="accent2"/>
+                  <a:srgbClr val="00B050"/>
                 </a:solidFill>
               </a:rPr>
               <a:t>Linear regression as a least square regression problem</a:t>
             </a:r>
             <a:endParaRPr lang="en-SG" dirty="0">
               <a:solidFill>
-                <a:schemeClr val="accent2"/>
+                <a:srgbClr val="00B050"/>
               </a:solidFill>
             </a:endParaRPr>
           </a:p>
@@ -6483,14 +6537,14 @@
             <a:r>
               <a:rPr lang="en-GB" dirty="0">
                 <a:solidFill>
-                  <a:schemeClr val="accent2"/>
+                  <a:srgbClr val="00B050"/>
                 </a:solidFill>
               </a:rPr>
               <a:t>Solving the linear MSE regression problem</a:t>
             </a:r>
             <a:endParaRPr lang="en-SG" dirty="0">
               <a:solidFill>
-                <a:schemeClr val="accent2"/>
+                <a:srgbClr val="00B050"/>
               </a:solidFill>
             </a:endParaRPr>
           </a:p>
@@ -14330,6 +14384,20 @@
             </a:r>
           </a:p>
           <a:p>
+            <a:r>
+              <a:rPr lang="en-GB" dirty="0"/>
+              <a:t>A quick word on </a:t>
+            </a:r>
+            <a:r>
+              <a:rPr lang="en-GB" dirty="0" err="1"/>
+              <a:t>pytorch</a:t>
+            </a:r>
+            <a:r>
+              <a:rPr lang="en-GB" dirty="0"/>
+              <a:t> 2.0</a:t>
+            </a:r>
+          </a:p>
+          <a:p>
             <a:endParaRPr lang="en-SG" dirty="0"/>
           </a:p>
         </p:txBody>
@@ -14542,14 +14610,14 @@
             <a:r>
               <a:rPr lang="en-GB" dirty="0">
                 <a:solidFill>
-                  <a:schemeClr val="accent2"/>
+                  <a:srgbClr val="00B050"/>
                 </a:solidFill>
               </a:rPr>
               <a:t>AI, ML, NN and DL differences</a:t>
             </a:r>
             <a:endParaRPr lang="en-SG" dirty="0">
               <a:solidFill>
-                <a:schemeClr val="accent2"/>
+                <a:srgbClr val="00B050"/>
               </a:solidFill>
             </a:endParaRPr>
           </a:p>

</xml_diff>